<commit_message>
code format & add 1 slider
</commit_message>
<xml_diff>
--- a/SpringMVC3.pptx
+++ b/SpringMVC3.pptx
@@ -11,6 +11,7 @@
     <p:sldId id="259" r:id="rId5"/>
     <p:sldId id="260" r:id="rId6"/>
     <p:sldId id="261" r:id="rId7"/>
+    <p:sldId id="262" r:id="rId8"/>
   </p:sldIdLst>
   <p:sldSz cx="9144000" cy="6858000" type="screen4x3"/>
   <p:notesSz cx="6858000" cy="9144000"/>
@@ -1925,7 +1926,7 @@
             <a:fld id="{E30E2307-1E40-4E12-8716-25BFDA8E7013}" type="datetime1">
               <a:rPr lang="en-US" smtClean="0"/>
               <a:pPr/>
-              <a:t>10/12/2013</a:t>
+              <a:t>13-10-13</a:t>
             </a:fld>
             <a:endParaRPr lang="en-US"/>
           </a:p>
@@ -2108,7 +2109,7 @@
             <a:fld id="{E5CFCF5A-EA79-452C-A52C-1A2668C2E7DF}" type="datetime1">
               <a:rPr lang="en-US" smtClean="0"/>
               <a:pPr/>
-              <a:t>10/12/2013</a:t>
+              <a:t>13-10-13</a:t>
             </a:fld>
             <a:endParaRPr lang="en-US"/>
           </a:p>
@@ -2261,7 +2262,7 @@
             <a:fld id="{2E5C4C28-BD4B-4892-9A2D-6E19BD753A9A}" type="datetime1">
               <a:rPr lang="en-US" smtClean="0"/>
               <a:pPr/>
-              <a:t>10/12/2013</a:t>
+              <a:t>13-10-13</a:t>
             </a:fld>
             <a:endParaRPr lang="en-US"/>
           </a:p>
@@ -4089,7 +4090,7 @@
             <a:fld id="{61FD9D02-426E-46C9-9EE9-0DE1EF8B2838}" type="datetime1">
               <a:rPr lang="en-US" smtClean="0"/>
               <a:pPr/>
-              <a:t>10/12/2013</a:t>
+              <a:t>13-10-13</a:t>
             </a:fld>
             <a:endParaRPr lang="en-US"/>
           </a:p>
@@ -5961,7 +5962,7 @@
             <a:fld id="{7B8AEBBE-F8B2-42CF-9895-E86A608384EB}" type="datetime1">
               <a:rPr lang="en-US" smtClean="0"/>
               <a:pPr/>
-              <a:t>10/12/2013</a:t>
+              <a:t>13-10-13</a:t>
             </a:fld>
             <a:endParaRPr lang="en-US"/>
           </a:p>
@@ -6076,7 +6077,7 @@
             <a:fld id="{E1FAA6B6-10E5-4810-BC9F-DA72D8452E73}" type="datetime1">
               <a:rPr lang="en-US" smtClean="0"/>
               <a:pPr/>
-              <a:t>10/12/2013</a:t>
+              <a:t>13-10-13</a:t>
             </a:fld>
             <a:endParaRPr lang="en-US"/>
           </a:p>
@@ -6619,7 +6620,7 @@
             <a:fld id="{6D18D072-EF12-4AA2-BD71-ABC68B06D0E2}" type="datetime1">
               <a:rPr lang="en-US" smtClean="0"/>
               <a:pPr/>
-              <a:t>10/12/2013</a:t>
+              <a:t>13-10-13</a:t>
             </a:fld>
             <a:endParaRPr lang="en-US"/>
           </a:p>
@@ -6734,7 +6735,7 @@
             <a:fld id="{B8CDBF60-6CC3-4B74-A60D-3486985E4346}" type="datetime1">
               <a:rPr lang="en-US" smtClean="0"/>
               <a:pPr/>
-              <a:t>10/12/2013</a:t>
+              <a:t>13-10-13</a:t>
             </a:fld>
             <a:endParaRPr lang="en-US"/>
           </a:p>
@@ -8447,7 +8448,7 @@
             <a:fld id="{22714818-984F-4759-BF72-A33BDC1963BD}" type="datetime1">
               <a:rPr lang="en-US" smtClean="0"/>
               <a:pPr/>
-              <a:t>10/12/2013</a:t>
+              <a:t>13-10-13</a:t>
             </a:fld>
             <a:endParaRPr lang="en-US"/>
           </a:p>
@@ -8600,7 +8601,7 @@
             <a:fld id="{9EA7E191-5F94-4FC1-B823-BD7CABF7FA06}" type="datetime1">
               <a:rPr lang="en-US" smtClean="0"/>
               <a:pPr/>
-              <a:t>10/12/2013</a:t>
+              <a:t>13-10-13</a:t>
             </a:fld>
             <a:endParaRPr lang="en-US"/>
           </a:p>
@@ -12217,7 +12218,7 @@
             <a:fld id="{88856D55-EFBE-4F9B-8A5F-09D42CA22A9B}" type="datetime1">
               <a:rPr lang="en-US" smtClean="0"/>
               <a:pPr/>
-              <a:t>10/12/2013</a:t>
+              <a:t>13-10-13</a:t>
             </a:fld>
             <a:endParaRPr lang="en-US"/>
           </a:p>
@@ -14078,7 +14079,7 @@
             <a:fld id="{9D1D110F-3F4E-48D9-B8AA-5D0E825AFDBA}" type="datetime1">
               <a:rPr lang="en-US" smtClean="0"/>
               <a:pPr/>
-              <a:t>10/12/2013</a:t>
+              <a:t>13-10-13</a:t>
             </a:fld>
             <a:endParaRPr lang="en-US"/>
           </a:p>
@@ -14699,7 +14700,7 @@
   <p:timing>
     <p:tnLst>
       <p:par>
-        <p:cTn id="1" dur="indefinite" restart="never" nodeType="tmRoot"/>
+        <p:cTn xmlns:p14="http://schemas.microsoft.com/office/powerpoint/2010/main" id="1" dur="indefinite" restart="never" nodeType="tmRoot"/>
       </p:par>
     </p:tnLst>
   </p:timing>
@@ -15100,7 +15101,7 @@
   <p:timing>
     <p:tnLst>
       <p:par>
-        <p:cTn id="1" dur="indefinite" restart="never" nodeType="tmRoot"/>
+        <p:cTn xmlns:p14="http://schemas.microsoft.com/office/powerpoint/2010/main" id="1" dur="indefinite" restart="never" nodeType="tmRoot"/>
       </p:par>
     </p:tnLst>
   </p:timing>
@@ -15561,7 +15562,7 @@
   <p:timing>
     <p:tnLst>
       <p:par>
-        <p:cTn id="1" dur="indefinite" restart="never" nodeType="tmRoot"/>
+        <p:cTn xmlns:p14="http://schemas.microsoft.com/office/powerpoint/2010/main" id="1" dur="indefinite" restart="never" nodeType="tmRoot"/>
       </p:par>
     </p:tnLst>
   </p:timing>
@@ -15820,15 +15821,7 @@
                 <a:ea typeface="+mj-ea"/>
                 <a:cs typeface="Heiti SC Light"/>
               </a:rPr>
-              <a:t>类型转</a:t>
-            </a:r>
-            <a:r>
-              <a:rPr kumimoji="1" lang="zh-CN" altLang="en-US" dirty="0" smtClean="0">
-                <a:latin typeface="+mj-ea"/>
-                <a:ea typeface="+mj-ea"/>
-                <a:cs typeface="Heiti SC Light"/>
-              </a:rPr>
-              <a:t>换</a:t>
+              <a:t>类型转换</a:t>
             </a:r>
             <a:r>
               <a:rPr kumimoji="1" lang="en-US" altLang="zh-CN" dirty="0" smtClean="0">
@@ -15876,15 +15869,7 @@
                 <a:ea typeface="+mj-ea"/>
                 <a:cs typeface="Heiti SC Light"/>
               </a:rPr>
-              <a:t>文</a:t>
-            </a:r>
-            <a:r>
-              <a:rPr kumimoji="1" lang="zh-CN" altLang="en-US" dirty="0" smtClean="0">
-                <a:latin typeface="+mj-ea"/>
-                <a:ea typeface="+mj-ea"/>
-                <a:cs typeface="Heiti SC Light"/>
-              </a:rPr>
-              <a:t>件上传</a:t>
+              <a:t>文件上传</a:t>
             </a:r>
             <a:endParaRPr kumimoji="1" lang="en-US" altLang="zh-CN" dirty="0" smtClean="0">
               <a:latin typeface="+mj-ea"/>
@@ -15965,15 +15950,7 @@
                 <a:ea typeface="+mj-ea"/>
                 <a:cs typeface="Heiti SC Light"/>
               </a:rPr>
-              <a:t>的新功</a:t>
-            </a:r>
-            <a:r>
-              <a:rPr kumimoji="1" lang="zh-CN" altLang="en-US" dirty="0" smtClean="0">
-                <a:latin typeface="+mj-ea"/>
-                <a:ea typeface="+mj-ea"/>
-                <a:cs typeface="Heiti SC Light"/>
-              </a:rPr>
-              <a:t>能</a:t>
+              <a:t>的新功能</a:t>
             </a:r>
             <a:endParaRPr kumimoji="1" lang="en-US" altLang="zh-CN" dirty="0" smtClean="0">
               <a:latin typeface="+mj-ea"/>
@@ -16297,7 +16274,7 @@
   <p:timing>
     <p:tnLst>
       <p:par>
-        <p:cTn id="1" dur="indefinite" restart="never" nodeType="tmRoot"/>
+        <p:cTn xmlns:p14="http://schemas.microsoft.com/office/powerpoint/2010/main" id="1" dur="indefinite" restart="never" nodeType="tmRoot"/>
       </p:par>
     </p:tnLst>
   </p:timing>
@@ -16412,15 +16389,7 @@
                 <a:ea typeface="+mj-ea"/>
                 <a:cs typeface="Heiti SC Light"/>
               </a:rPr>
-              <a:t>app</a:t>
-            </a:r>
-            <a:r>
-              <a:rPr kumimoji="1" lang="en-US" altLang="zh-CN" dirty="0" smtClean="0">
-                <a:latin typeface="+mj-ea"/>
-                <a:ea typeface="+mj-ea"/>
-                <a:cs typeface="Heiti SC Light"/>
-              </a:rPr>
-              <a:t>Name-servlet.xml</a:t>
+              <a:t>appName-servlet.xml</a:t>
             </a:r>
           </a:p>
           <a:p>
@@ -16757,7 +16726,7 @@
   <p:timing>
     <p:tnLst>
       <p:par>
-        <p:cTn id="1" dur="indefinite" restart="never" nodeType="tmRoot"/>
+        <p:cTn xmlns:p14="http://schemas.microsoft.com/office/powerpoint/2010/main" id="1" dur="indefinite" restart="never" nodeType="tmRoot"/>
       </p:par>
     </p:tnLst>
   </p:timing>
@@ -16794,7 +16763,7 @@
         <p:spPr>
           <a:xfrm>
             <a:off x="872067" y="1856096"/>
-            <a:ext cx="7408333" cy="4476465"/>
+            <a:ext cx="7408333" cy="1759175"/>
           </a:xfrm>
         </p:spPr>
         <p:txBody>
@@ -16808,36 +16777,82 @@
               <a:buChar char="Ø"/>
             </a:pPr>
             <a:r>
-              <a:rPr kumimoji="1" lang="zh-CN" altLang="en-US" dirty="0" smtClean="0">
-                <a:latin typeface="+mj-ea"/>
-                <a:ea typeface="+mj-ea"/>
-                <a:cs typeface="Heiti SC Light"/>
-              </a:rPr>
-              <a:t>在</a:t>
-            </a:r>
-            <a:r>
-              <a:rPr kumimoji="1" lang="en-US" altLang="zh-CN" dirty="0" smtClean="0">
-                <a:latin typeface="+mj-ea"/>
-                <a:ea typeface="+mj-ea"/>
-                <a:cs typeface="Heiti SC Light"/>
-              </a:rPr>
-              <a:t>web.xml</a:t>
-            </a:r>
-            <a:r>
-              <a:rPr kumimoji="1" lang="zh-CN" altLang="en-US" dirty="0" smtClean="0">
-                <a:latin typeface="+mj-ea"/>
-                <a:ea typeface="+mj-ea"/>
-                <a:cs typeface="Heiti SC Light"/>
-              </a:rPr>
-              <a:t>中注册</a:t>
-            </a:r>
-            <a:r>
               <a:rPr kumimoji="1" lang="en-US" altLang="zh-CN" dirty="0" err="1" smtClean="0">
                 <a:latin typeface="+mj-ea"/>
                 <a:ea typeface="+mj-ea"/>
                 <a:cs typeface="Heiti SC Light"/>
               </a:rPr>
               <a:t>DispatcherServlet</a:t>
+            </a:r>
+            <a:r>
+              <a:rPr kumimoji="1" lang="zh-CN" altLang="en-US" dirty="0" smtClean="0">
+                <a:latin typeface="+mj-ea"/>
+                <a:ea typeface="+mj-ea"/>
+                <a:cs typeface="Heiti SC Light"/>
+              </a:rPr>
+              <a:t>把</a:t>
+            </a:r>
+            <a:r>
+              <a:rPr kumimoji="1" lang="en-US" altLang="zh-CN" dirty="0" smtClean="0">
+                <a:latin typeface="+mj-ea"/>
+                <a:ea typeface="+mj-ea"/>
+                <a:cs typeface="Heiti SC Light"/>
+              </a:rPr>
+              <a:t>Request</a:t>
+            </a:r>
+            <a:r>
+              <a:rPr kumimoji="1" lang="zh-CN" altLang="en-US" dirty="0" smtClean="0">
+                <a:latin typeface="+mj-ea"/>
+                <a:ea typeface="+mj-ea"/>
+                <a:cs typeface="Heiti SC Light"/>
+              </a:rPr>
+              <a:t>映射到</a:t>
+            </a:r>
+            <a:r>
+              <a:rPr kumimoji="1" lang="en-US" altLang="zh-CN" dirty="0" smtClean="0">
+                <a:latin typeface="+mj-ea"/>
+                <a:ea typeface="+mj-ea"/>
+                <a:cs typeface="Heiti SC Light"/>
+              </a:rPr>
+              <a:t>@Controller</a:t>
+            </a:r>
+          </a:p>
+          <a:p>
+            <a:pPr lvl="1">
+              <a:buFont typeface="Wingdings" charset="2"/>
+              <a:buChar char="Ø"/>
+            </a:pPr>
+            <a:r>
+              <a:rPr kumimoji="1" lang="zh-CN" altLang="en-US" dirty="0" smtClean="0">
+                <a:latin typeface="+mj-ea"/>
+                <a:ea typeface="+mj-ea"/>
+                <a:cs typeface="Heiti SC Light"/>
+              </a:rPr>
+              <a:t>通过</a:t>
+            </a:r>
+            <a:r>
+              <a:rPr kumimoji="1" lang="en-US" altLang="zh-CN" dirty="0">
+                <a:latin typeface="+mj-ea"/>
+                <a:ea typeface="+mj-ea"/>
+                <a:cs typeface="Heiti SC Light"/>
+              </a:rPr>
+              <a:t>@</a:t>
+            </a:r>
+            <a:r>
+              <a:rPr kumimoji="1" lang="en-US" altLang="zh-CN" dirty="0" err="1" smtClean="0">
+                <a:latin typeface="+mj-ea"/>
+                <a:ea typeface="+mj-ea"/>
+                <a:cs typeface="Heiti SC Light"/>
+              </a:rPr>
+              <a:t>RequestMapping</a:t>
+            </a:r>
+            <a:r>
+              <a:rPr kumimoji="1" lang="zh-CN" altLang="en-US" dirty="0" smtClean="0">
+                <a:latin typeface="+mj-ea"/>
+                <a:ea typeface="+mj-ea"/>
+                <a:cs typeface="Heiti SC Light"/>
+              </a:rPr>
+              <a:t>定义映射规则</a:t>
             </a:r>
             <a:endParaRPr kumimoji="1" lang="en-US" altLang="zh-CN" dirty="0" smtClean="0">
               <a:latin typeface="+mj-ea"/>
@@ -16846,69 +16861,33 @@
             </a:endParaRPr>
           </a:p>
           <a:p>
-            <a:pPr>
+            <a:pPr lvl="1">
               <a:buFont typeface="Wingdings" charset="2"/>
               <a:buChar char="Ø"/>
             </a:pPr>
+            <a:r>
+              <a:rPr kumimoji="1" lang="zh-CN" altLang="en-US" dirty="0" smtClean="0">
+                <a:latin typeface="+mj-ea"/>
+                <a:ea typeface="+mj-ea"/>
+                <a:cs typeface="Heiti SC Light"/>
+              </a:rPr>
+              <a:t>通过方法参数来获取</a:t>
+            </a:r>
             <a:r>
               <a:rPr kumimoji="1" lang="en-US" altLang="zh-CN" dirty="0" smtClean="0">
                 <a:latin typeface="+mj-ea"/>
                 <a:ea typeface="+mj-ea"/>
                 <a:cs typeface="Heiti SC Light"/>
               </a:rPr>
-              <a:t>Spring</a:t>
-            </a:r>
-            <a:r>
-              <a:rPr kumimoji="1" lang="zh-CN" altLang="en-US" dirty="0">
+              <a:t>Request</a:t>
+            </a:r>
+            <a:r>
+              <a:rPr kumimoji="1" lang="zh-CN" altLang="en-US" dirty="0" smtClean="0">
                 <a:latin typeface="+mj-ea"/>
                 <a:ea typeface="+mj-ea"/>
                 <a:cs typeface="Heiti SC Light"/>
               </a:rPr>
-              <a:t>环境</a:t>
-            </a:r>
-            <a:r>
-              <a:rPr kumimoji="1" lang="en-US" altLang="zh-CN" dirty="0" smtClean="0">
-                <a:latin typeface="+mj-ea"/>
-                <a:ea typeface="+mj-ea"/>
-                <a:cs typeface="Heiti SC Light"/>
-              </a:rPr>
-              <a:t>app</a:t>
-            </a:r>
-            <a:r>
-              <a:rPr kumimoji="1" lang="en-US" altLang="zh-CN" dirty="0" smtClean="0">
-                <a:latin typeface="+mj-ea"/>
-                <a:ea typeface="+mj-ea"/>
-                <a:cs typeface="Heiti SC Light"/>
-              </a:rPr>
-              <a:t>Name-servlet.xml</a:t>
-            </a:r>
-          </a:p>
-          <a:p>
-            <a:pPr lvl="1">
-              <a:buFont typeface="Wingdings" charset="2"/>
-              <a:buChar char="Ø"/>
-            </a:pPr>
-            <a:r>
-              <a:rPr kumimoji="1" lang="en-US" altLang="zh-CN" dirty="0" smtClean="0">
-                <a:latin typeface="+mj-ea"/>
-                <a:ea typeface="+mj-ea"/>
-                <a:cs typeface="Heiti SC Light"/>
-              </a:rPr>
-              <a:t>component-scan</a:t>
-            </a:r>
-          </a:p>
-          <a:p>
-            <a:pPr lvl="1">
-              <a:buFont typeface="Wingdings" charset="2"/>
-              <a:buChar char="Ø"/>
-            </a:pPr>
-            <a:r>
-              <a:rPr kumimoji="1" lang="en-US" altLang="zh-CN" dirty="0" err="1" smtClean="0">
-                <a:latin typeface="+mj-ea"/>
-                <a:ea typeface="+mj-ea"/>
-                <a:cs typeface="Heiti SC Light"/>
-              </a:rPr>
-              <a:t>ViewResolver</a:t>
+              <a:t>的内容</a:t>
             </a:r>
             <a:endParaRPr kumimoji="1" lang="en-US" altLang="zh-CN" dirty="0" smtClean="0">
               <a:latin typeface="+mj-ea"/>
@@ -16917,46 +16896,35 @@
             </a:endParaRPr>
           </a:p>
           <a:p>
-            <a:pPr>
+            <a:pPr lvl="1">
               <a:buFont typeface="Wingdings" charset="2"/>
               <a:buChar char="Ø"/>
             </a:pPr>
             <a:r>
-              <a:rPr kumimoji="1" lang="en-US" altLang="zh-CN" dirty="0" err="1" smtClean="0">
+              <a:rPr kumimoji="1" lang="zh-CN" altLang="en-US" dirty="0" smtClean="0">
                 <a:latin typeface="+mj-ea"/>
                 <a:ea typeface="+mj-ea"/>
                 <a:cs typeface="Heiti SC Light"/>
               </a:rPr>
-              <a:t>HelloController</a:t>
-            </a:r>
-            <a:endParaRPr kumimoji="1" lang="en-US" altLang="zh-CN" dirty="0" smtClean="0">
-              <a:latin typeface="+mj-ea"/>
-              <a:ea typeface="+mj-ea"/>
-              <a:cs typeface="Heiti SC Light"/>
-            </a:endParaRPr>
-          </a:p>
-          <a:p>
-            <a:pPr>
-              <a:buFont typeface="Wingdings" charset="2"/>
-              <a:buChar char="Ø"/>
-            </a:pPr>
-            <a:r>
-              <a:rPr kumimoji="1" lang="en-US" altLang="zh-CN" dirty="0" err="1">
+              <a:t>通过方法的返回值来生成</a:t>
+            </a:r>
+            <a:r>
+              <a:rPr kumimoji="1" lang="en-US" altLang="zh-CN" dirty="0" smtClean="0">
                 <a:latin typeface="+mj-ea"/>
                 <a:ea typeface="+mj-ea"/>
                 <a:cs typeface="Heiti SC Light"/>
               </a:rPr>
-              <a:t>h</a:t>
-            </a:r>
-            <a:r>
-              <a:rPr kumimoji="1" lang="en-US" altLang="zh-CN" dirty="0" err="1" smtClean="0">
+              <a:t>Response</a:t>
+            </a:r>
+            <a:r>
+              <a:rPr kumimoji="1" lang="zh-CN" altLang="en-US" dirty="0" smtClean="0">
                 <a:latin typeface="+mj-ea"/>
                 <a:ea typeface="+mj-ea"/>
                 <a:cs typeface="Heiti SC Light"/>
               </a:rPr>
-              <a:t>ello.jsp</a:t>
-            </a:r>
-            <a:endParaRPr kumimoji="1" lang="en-US" altLang="zh-CN" dirty="0" smtClean="0">
+              <a:t>的内容</a:t>
+            </a:r>
+            <a:endParaRPr kumimoji="1" lang="en-US" altLang="zh-CN" dirty="0">
               <a:latin typeface="+mj-ea"/>
               <a:ea typeface="+mj-ea"/>
               <a:cs typeface="Heiti SC Light"/>
@@ -17211,6 +17179,160 @@
           </a:p>
         </p:txBody>
       </p:sp>
+      <p:sp>
+        <p:nvSpPr>
+          <p:cNvPr id="3" name="矩形 2"/>
+          <p:cNvSpPr/>
+          <p:nvPr/>
+        </p:nvSpPr>
+        <p:spPr>
+          <a:xfrm>
+            <a:off x="1301138" y="3822598"/>
+            <a:ext cx="5968482" cy="2585323"/>
+          </a:xfrm>
+          <a:prstGeom prst="rect">
+            <a:avLst/>
+          </a:prstGeom>
+        </p:spPr>
+        <p:txBody>
+          <a:bodyPr wrap="square">
+            <a:spAutoFit/>
+          </a:bodyPr>
+          <a:lstStyle/>
+          <a:p>
+            <a:r>
+              <a:rPr lang="en-US" altLang="zh-CN" dirty="0">
+                <a:latin typeface="Courier New"/>
+                <a:ea typeface="+mj-ea"/>
+                <a:cs typeface="Courier New"/>
+              </a:rPr>
+              <a:t>@Controller</a:t>
+            </a:r>
+          </a:p>
+          <a:p>
+            <a:r>
+              <a:rPr lang="en-US" altLang="zh-CN" dirty="0">
+                <a:latin typeface="Courier New"/>
+                <a:ea typeface="+mj-ea"/>
+                <a:cs typeface="Courier New"/>
+              </a:rPr>
+              <a:t>public class </a:t>
+            </a:r>
+            <a:r>
+              <a:rPr lang="en-US" altLang="zh-CN" dirty="0" err="1">
+                <a:latin typeface="Courier New"/>
+                <a:ea typeface="+mj-ea"/>
+                <a:cs typeface="Courier New"/>
+              </a:rPr>
+              <a:t>SimpleController</a:t>
+            </a:r>
+            <a:r>
+              <a:rPr lang="en-US" altLang="zh-CN" dirty="0">
+                <a:latin typeface="Courier New"/>
+                <a:ea typeface="+mj-ea"/>
+                <a:cs typeface="Courier New"/>
+              </a:rPr>
+              <a:t> {</a:t>
+            </a:r>
+          </a:p>
+          <a:p>
+            <a:endParaRPr lang="en-US" altLang="zh-CN" dirty="0">
+              <a:latin typeface="Courier New"/>
+              <a:ea typeface="+mj-ea"/>
+              <a:cs typeface="Courier New"/>
+            </a:endParaRPr>
+          </a:p>
+          <a:p>
+            <a:r>
+              <a:rPr lang="en-US" altLang="zh-CN" dirty="0">
+                <a:latin typeface="Courier New"/>
+                <a:ea typeface="+mj-ea"/>
+                <a:cs typeface="Courier New"/>
+              </a:rPr>
+              <a:t>    @</a:t>
+            </a:r>
+            <a:r>
+              <a:rPr lang="en-US" altLang="zh-CN" dirty="0" err="1">
+                <a:latin typeface="Courier New"/>
+                <a:ea typeface="+mj-ea"/>
+                <a:cs typeface="Courier New"/>
+              </a:rPr>
+              <a:t>RequestMapping</a:t>
+            </a:r>
+            <a:r>
+              <a:rPr lang="en-US" altLang="zh-CN" dirty="0">
+                <a:latin typeface="Courier New"/>
+                <a:ea typeface="+mj-ea"/>
+                <a:cs typeface="Courier New"/>
+              </a:rPr>
+              <a:t>("/simple")</a:t>
+            </a:r>
+          </a:p>
+          <a:p>
+            <a:r>
+              <a:rPr lang="en-US" altLang="zh-CN" dirty="0">
+                <a:latin typeface="Courier New"/>
+                <a:ea typeface="+mj-ea"/>
+                <a:cs typeface="Courier New"/>
+              </a:rPr>
+              <a:t>    public @</a:t>
+            </a:r>
+            <a:r>
+              <a:rPr lang="en-US" altLang="zh-CN" dirty="0" err="1">
+                <a:latin typeface="Courier New"/>
+                <a:ea typeface="+mj-ea"/>
+                <a:cs typeface="Courier New"/>
+              </a:rPr>
+              <a:t>ResponseBody</a:t>
+            </a:r>
+            <a:r>
+              <a:rPr lang="en-US" altLang="zh-CN" dirty="0">
+                <a:latin typeface="Courier New"/>
+                <a:ea typeface="+mj-ea"/>
+                <a:cs typeface="Courier New"/>
+              </a:rPr>
+              <a:t> String simple() {</a:t>
+            </a:r>
+          </a:p>
+          <a:p>
+            <a:r>
+              <a:rPr lang="en-US" altLang="zh-CN" dirty="0">
+                <a:latin typeface="Courier New"/>
+                <a:ea typeface="+mj-ea"/>
+                <a:cs typeface="Courier New"/>
+              </a:rPr>
+              <a:t>        return "Hello world!";</a:t>
+            </a:r>
+          </a:p>
+          <a:p>
+            <a:r>
+              <a:rPr lang="en-US" altLang="zh-CN" dirty="0">
+                <a:latin typeface="Courier New"/>
+                <a:ea typeface="+mj-ea"/>
+                <a:cs typeface="Courier New"/>
+              </a:rPr>
+              <a:t>    }</a:t>
+            </a:r>
+          </a:p>
+          <a:p>
+            <a:endParaRPr lang="en-US" altLang="zh-CN" dirty="0">
+              <a:latin typeface="Courier New"/>
+              <a:ea typeface="+mj-ea"/>
+              <a:cs typeface="Courier New"/>
+            </a:endParaRPr>
+          </a:p>
+          <a:p>
+            <a:r>
+              <a:rPr lang="en-US" altLang="zh-CN" dirty="0">
+                <a:latin typeface="Courier New"/>
+                <a:ea typeface="+mj-ea"/>
+                <a:cs typeface="Courier New"/>
+              </a:rPr>
+              <a:t>}</a:t>
+            </a:r>
+          </a:p>
+        </p:txBody>
+      </p:sp>
     </p:spTree>
     <p:extLst>
       <p:ext uri="{BB962C8B-B14F-4D97-AF65-F5344CB8AC3E}">
@@ -17224,7 +17346,792 @@
   <p:timing>
     <p:tnLst>
       <p:par>
-        <p:cTn id="1" dur="indefinite" restart="never" nodeType="tmRoot"/>
+        <p:cTn xmlns:p14="http://schemas.microsoft.com/office/powerpoint/2010/main" id="1" dur="indefinite" restart="never" nodeType="tmRoot">
+          <p:childTnLst>
+            <p:seq concurrent="1" nextAc="seek">
+              <p:cTn id="2" dur="indefinite" nodeType="mainSeq">
+                <p:childTnLst>
+                  <p:par>
+                    <p:cTn id="3" fill="hold">
+                      <p:stCondLst>
+                        <p:cond delay="indefinite"/>
+                      </p:stCondLst>
+                      <p:childTnLst>
+                        <p:par>
+                          <p:cTn id="4" fill="hold">
+                            <p:stCondLst>
+                              <p:cond delay="0"/>
+                            </p:stCondLst>
+                            <p:childTnLst>
+                              <p:par>
+                                <p:cTn id="5" presetID="2" presetClass="entr" presetSubtype="2" fill="hold" grpId="0" nodeType="clickEffect">
+                                  <p:stCondLst>
+                                    <p:cond delay="0"/>
+                                  </p:stCondLst>
+                                  <p:childTnLst>
+                                    <p:set>
+                                      <p:cBhvr>
+                                        <p:cTn id="6" dur="1" fill="hold">
+                                          <p:stCondLst>
+                                            <p:cond delay="0"/>
+                                          </p:stCondLst>
+                                        </p:cTn>
+                                        <p:tgtEl>
+                                          <p:spTgt spid="3"/>
+                                        </p:tgtEl>
+                                        <p:attrNameLst>
+                                          <p:attrName>style.visibility</p:attrName>
+                                        </p:attrNameLst>
+                                      </p:cBhvr>
+                                      <p:to>
+                                        <p:strVal val="visible"/>
+                                      </p:to>
+                                    </p:set>
+                                    <p:anim calcmode="lin" valueType="num">
+                                      <p:cBhvr additive="base">
+                                        <p:cTn id="7" dur="500" fill="hold"/>
+                                        <p:tgtEl>
+                                          <p:spTgt spid="3"/>
+                                        </p:tgtEl>
+                                        <p:attrNameLst>
+                                          <p:attrName>ppt_x</p:attrName>
+                                        </p:attrNameLst>
+                                      </p:cBhvr>
+                                      <p:tavLst>
+                                        <p:tav tm="0">
+                                          <p:val>
+                                            <p:strVal val="1+#ppt_w/2"/>
+                                          </p:val>
+                                        </p:tav>
+                                        <p:tav tm="100000">
+                                          <p:val>
+                                            <p:strVal val="#ppt_x"/>
+                                          </p:val>
+                                        </p:tav>
+                                      </p:tavLst>
+                                    </p:anim>
+                                    <p:anim calcmode="lin" valueType="num">
+                                      <p:cBhvr additive="base">
+                                        <p:cTn id="8" dur="500" fill="hold"/>
+                                        <p:tgtEl>
+                                          <p:spTgt spid="3"/>
+                                        </p:tgtEl>
+                                        <p:attrNameLst>
+                                          <p:attrName>ppt_y</p:attrName>
+                                        </p:attrNameLst>
+                                      </p:cBhvr>
+                                      <p:tavLst>
+                                        <p:tav tm="0">
+                                          <p:val>
+                                            <p:strVal val="#ppt_y"/>
+                                          </p:val>
+                                        </p:tav>
+                                        <p:tav tm="100000">
+                                          <p:val>
+                                            <p:strVal val="#ppt_y"/>
+                                          </p:val>
+                                        </p:tav>
+                                      </p:tavLst>
+                                    </p:anim>
+                                  </p:childTnLst>
+                                </p:cTn>
+                              </p:par>
+                            </p:childTnLst>
+                          </p:cTn>
+                        </p:par>
+                      </p:childTnLst>
+                    </p:cTn>
+                  </p:par>
+                </p:childTnLst>
+              </p:cTn>
+              <p:prevCondLst>
+                <p:cond evt="onPrev" delay="0">
+                  <p:tgtEl>
+                    <p:sldTgt/>
+                  </p:tgtEl>
+                </p:cond>
+              </p:prevCondLst>
+              <p:nextCondLst>
+                <p:cond evt="onNext" delay="0">
+                  <p:tgtEl>
+                    <p:sldTgt/>
+                  </p:tgtEl>
+                </p:cond>
+              </p:nextCondLst>
+            </p:seq>
+          </p:childTnLst>
+        </p:cTn>
+      </p:par>
+    </p:tnLst>
+    <p:bldLst>
+      <p:bldP spid="3" grpId="0"/>
+    </p:bldLst>
+  </p:timing>
+</p:sld>
+</file>
+
+<file path=ppt/slides/slide7.xml><?xml version="1.0" encoding="utf-8"?>
+<p:sld xmlns:a="http://schemas.openxmlformats.org/drawingml/2006/main" xmlns:r="http://schemas.openxmlformats.org/officeDocument/2006/relationships" xmlns:p="http://schemas.openxmlformats.org/presentationml/2006/main">
+  <p:cSld>
+    <p:spTree>
+      <p:nvGrpSpPr>
+        <p:cNvPr id="1" name=""/>
+        <p:cNvGrpSpPr/>
+        <p:nvPr/>
+      </p:nvGrpSpPr>
+      <p:grpSpPr>
+        <a:xfrm>
+          <a:off x="0" y="0"/>
+          <a:ext cx="0" cy="0"/>
+          <a:chOff x="0" y="0"/>
+          <a:chExt cx="0" cy="0"/>
+        </a:xfrm>
+      </p:grpSpPr>
+      <p:sp>
+        <p:nvSpPr>
+          <p:cNvPr id="5" name="内容占位符 4"/>
+          <p:cNvSpPr>
+            <a:spLocks noGrp="1"/>
+          </p:cNvSpPr>
+          <p:nvPr>
+            <p:ph idx="1"/>
+          </p:nvPr>
+        </p:nvSpPr>
+        <p:spPr>
+          <a:xfrm>
+            <a:off x="872067" y="1856096"/>
+            <a:ext cx="7408333" cy="4260061"/>
+          </a:xfrm>
+        </p:spPr>
+        <p:txBody>
+          <a:bodyPr>
+            <a:normAutofit fontScale="92500" lnSpcReduction="20000"/>
+          </a:bodyPr>
+          <a:lstStyle/>
+          <a:p>
+            <a:pPr>
+              <a:buFont typeface="Wingdings" charset="2"/>
+              <a:buChar char="Ø"/>
+            </a:pPr>
+            <a:r>
+              <a:rPr kumimoji="1" lang="zh-CN" altLang="en-US" sz="2000" dirty="0" smtClean="0">
+                <a:latin typeface="+mj-ea"/>
+                <a:ea typeface="+mj-ea"/>
+                <a:cs typeface="Heiti SC Light"/>
+              </a:rPr>
+              <a:t>通过</a:t>
+            </a:r>
+            <a:r>
+              <a:rPr kumimoji="1" lang="en-US" altLang="zh-CN" sz="2000" dirty="0" smtClean="0">
+                <a:latin typeface="+mj-ea"/>
+                <a:ea typeface="+mj-ea"/>
+                <a:cs typeface="Heiti SC Light"/>
+              </a:rPr>
+              <a:t>Path</a:t>
+            </a:r>
+          </a:p>
+          <a:p>
+            <a:pPr lvl="1">
+              <a:buFont typeface="Wingdings" charset="2"/>
+              <a:buChar char="Ø"/>
+            </a:pPr>
+            <a:r>
+              <a:rPr kumimoji="1" lang="en-US" altLang="zh-CN" sz="1800" dirty="0">
+                <a:latin typeface="+mj-ea"/>
+                <a:ea typeface="+mj-ea"/>
+                <a:cs typeface="Heiti SC Light"/>
+              </a:rPr>
+              <a:t>@</a:t>
+            </a:r>
+            <a:r>
+              <a:rPr kumimoji="1" lang="en-US" altLang="zh-CN" sz="1800" dirty="0" err="1">
+                <a:latin typeface="+mj-ea"/>
+                <a:ea typeface="+mj-ea"/>
+                <a:cs typeface="Heiti SC Light"/>
+              </a:rPr>
+              <a:t>RequestMapping</a:t>
+            </a:r>
+            <a:r>
+              <a:rPr kumimoji="1" lang="en-US" altLang="zh-CN" sz="1800" dirty="0">
+                <a:latin typeface="+mj-ea"/>
+                <a:ea typeface="+mj-ea"/>
+                <a:cs typeface="Heiti SC Light"/>
+              </a:rPr>
+              <a:t>("path"</a:t>
+            </a:r>
+            <a:r>
+              <a:rPr kumimoji="1" lang="en-US" altLang="zh-CN" sz="1800" dirty="0" smtClean="0">
+                <a:latin typeface="+mj-ea"/>
+                <a:ea typeface="+mj-ea"/>
+                <a:cs typeface="Heiti SC Light"/>
+              </a:rPr>
+              <a:t>)</a:t>
+            </a:r>
+          </a:p>
+          <a:p>
+            <a:pPr lvl="1">
+              <a:buFont typeface="Wingdings" charset="2"/>
+              <a:buChar char="Ø"/>
+            </a:pPr>
+            <a:endParaRPr kumimoji="1" lang="en-US" altLang="zh-CN" dirty="0" smtClean="0">
+              <a:latin typeface="+mj-ea"/>
+              <a:ea typeface="+mj-ea"/>
+              <a:cs typeface="Heiti SC Light"/>
+            </a:endParaRPr>
+          </a:p>
+          <a:p>
+            <a:pPr>
+              <a:buFont typeface="Wingdings" charset="2"/>
+              <a:buChar char="Ø"/>
+            </a:pPr>
+            <a:r>
+              <a:rPr kumimoji="1" lang="zh-CN" altLang="en-US" sz="2000" dirty="0" smtClean="0">
+                <a:latin typeface="+mj-ea"/>
+                <a:ea typeface="+mj-ea"/>
+                <a:cs typeface="Heiti SC Light"/>
+              </a:rPr>
+              <a:t>通过</a:t>
+            </a:r>
+            <a:r>
+              <a:rPr kumimoji="1" lang="en-US" altLang="zh-CN" sz="2000" dirty="0" smtClean="0">
+                <a:latin typeface="+mj-ea"/>
+                <a:ea typeface="+mj-ea"/>
+                <a:cs typeface="Heiti SC Light"/>
+              </a:rPr>
+              <a:t>HTTP</a:t>
+            </a:r>
+            <a:r>
+              <a:rPr kumimoji="1" lang="zh-CN" altLang="en-US" sz="2000" dirty="0" smtClean="0">
+                <a:latin typeface="+mj-ea"/>
+                <a:ea typeface="+mj-ea"/>
+                <a:cs typeface="Heiti SC Light"/>
+              </a:rPr>
+              <a:t>方法</a:t>
+            </a:r>
+            <a:endParaRPr kumimoji="1" lang="en-US" altLang="zh-CN" sz="2000" dirty="0" smtClean="0">
+              <a:latin typeface="+mj-ea"/>
+              <a:ea typeface="+mj-ea"/>
+              <a:cs typeface="Heiti SC Light"/>
+            </a:endParaRPr>
+          </a:p>
+          <a:p>
+            <a:pPr lvl="1">
+              <a:buFont typeface="Wingdings" charset="2"/>
+              <a:buChar char="Ø"/>
+            </a:pPr>
+            <a:r>
+              <a:rPr kumimoji="1" lang="en-US" altLang="zh-CN" sz="1800" dirty="0">
+                <a:latin typeface="+mj-ea"/>
+                <a:ea typeface="+mj-ea"/>
+                <a:cs typeface="Heiti SC Light"/>
+              </a:rPr>
+              <a:t>@</a:t>
+            </a:r>
+            <a:r>
+              <a:rPr kumimoji="1" lang="en-US" altLang="zh-CN" sz="1800" dirty="0" err="1">
+                <a:latin typeface="+mj-ea"/>
+                <a:ea typeface="+mj-ea"/>
+                <a:cs typeface="Heiti SC Light"/>
+              </a:rPr>
+              <a:t>RequestMapping</a:t>
+            </a:r>
+            <a:r>
+              <a:rPr kumimoji="1" lang="en-US" altLang="zh-CN" sz="1800" dirty="0">
+                <a:latin typeface="+mj-ea"/>
+                <a:ea typeface="+mj-ea"/>
+                <a:cs typeface="Heiti SC Light"/>
+              </a:rPr>
+              <a:t>("path", method=</a:t>
+            </a:r>
+            <a:r>
+              <a:rPr kumimoji="1" lang="en-US" altLang="zh-CN" sz="1800" dirty="0" err="1">
+                <a:latin typeface="+mj-ea"/>
+                <a:ea typeface="+mj-ea"/>
+                <a:cs typeface="Heiti SC Light"/>
+              </a:rPr>
+              <a:t>RequestMethod.GET</a:t>
+            </a:r>
+            <a:r>
+              <a:rPr kumimoji="1" lang="en-US" altLang="zh-CN" sz="1800" dirty="0" smtClean="0">
+                <a:latin typeface="+mj-ea"/>
+                <a:ea typeface="+mj-ea"/>
+                <a:cs typeface="Heiti SC Light"/>
+              </a:rPr>
+              <a:t>)</a:t>
+            </a:r>
+            <a:endParaRPr kumimoji="1" lang="en-US" altLang="zh-CN" sz="1800" dirty="0" smtClean="0">
+              <a:latin typeface="+mj-ea"/>
+              <a:ea typeface="+mj-ea"/>
+              <a:cs typeface="Heiti SC Light"/>
+            </a:endParaRPr>
+          </a:p>
+          <a:p>
+            <a:pPr lvl="1">
+              <a:buFont typeface="Wingdings" charset="2"/>
+              <a:buChar char="Ø"/>
+            </a:pPr>
+            <a:r>
+              <a:rPr kumimoji="1" lang="zh-CN" altLang="en-US" sz="1800" dirty="0" smtClean="0">
+                <a:latin typeface="+mj-ea"/>
+                <a:ea typeface="+mj-ea"/>
+                <a:cs typeface="Heiti SC Light"/>
+              </a:rPr>
+              <a:t>支持</a:t>
+            </a:r>
+            <a:r>
+              <a:rPr kumimoji="1" lang="en-US" altLang="zh-CN" sz="1800" dirty="0" smtClean="0">
+                <a:latin typeface="+mj-ea"/>
+                <a:ea typeface="+mj-ea"/>
+                <a:cs typeface="Heiti SC Light"/>
+              </a:rPr>
+              <a:t>POST</a:t>
+            </a:r>
+            <a:r>
+              <a:rPr kumimoji="1" lang="zh-CN" altLang="en-US" sz="1800" dirty="0" smtClean="0">
+                <a:latin typeface="+mj-ea"/>
+                <a:ea typeface="+mj-ea"/>
+                <a:cs typeface="Heiti SC Light"/>
+              </a:rPr>
+              <a:t>，</a:t>
+            </a:r>
+            <a:r>
+              <a:rPr kumimoji="1" lang="en-US" altLang="zh-CN" sz="1800" dirty="0" smtClean="0">
+                <a:latin typeface="+mj-ea"/>
+                <a:ea typeface="+mj-ea"/>
+                <a:cs typeface="Heiti SC Light"/>
+              </a:rPr>
+              <a:t>GET</a:t>
+            </a:r>
+            <a:r>
+              <a:rPr kumimoji="1" lang="zh-CN" altLang="en-US" sz="1800" dirty="0" smtClean="0">
+                <a:latin typeface="+mj-ea"/>
+                <a:ea typeface="+mj-ea"/>
+                <a:cs typeface="Heiti SC Light"/>
+              </a:rPr>
+              <a:t>，</a:t>
+            </a:r>
+            <a:r>
+              <a:rPr kumimoji="1" lang="en-US" altLang="zh-CN" sz="1800" dirty="0" smtClean="0">
+                <a:latin typeface="+mj-ea"/>
+                <a:ea typeface="+mj-ea"/>
+                <a:cs typeface="Heiti SC Light"/>
+              </a:rPr>
+              <a:t>PUT</a:t>
+            </a:r>
+            <a:r>
+              <a:rPr kumimoji="1" lang="zh-CN" altLang="en-US" sz="1800" dirty="0" smtClean="0">
+                <a:latin typeface="+mj-ea"/>
+                <a:ea typeface="+mj-ea"/>
+                <a:cs typeface="Heiti SC Light"/>
+              </a:rPr>
+              <a:t>，</a:t>
+            </a:r>
+            <a:r>
+              <a:rPr kumimoji="1" lang="en-US" altLang="zh-CN" sz="1800" dirty="0" smtClean="0">
+                <a:latin typeface="+mj-ea"/>
+                <a:ea typeface="+mj-ea"/>
+                <a:cs typeface="Heiti SC Light"/>
+              </a:rPr>
+              <a:t>DELETE</a:t>
+            </a:r>
+            <a:r>
+              <a:rPr kumimoji="1" lang="zh-CN" altLang="en-US" sz="1800" dirty="0" smtClean="0">
+                <a:latin typeface="+mj-ea"/>
+                <a:ea typeface="+mj-ea"/>
+                <a:cs typeface="Heiti SC Light"/>
+              </a:rPr>
+              <a:t>，</a:t>
+            </a:r>
+            <a:r>
+              <a:rPr kumimoji="1" lang="en-US" altLang="zh-CN" sz="1800" dirty="0" smtClean="0">
+                <a:latin typeface="+mj-ea"/>
+                <a:ea typeface="+mj-ea"/>
+                <a:cs typeface="Heiti SC Light"/>
+              </a:rPr>
+              <a:t>OPTIONS</a:t>
+            </a:r>
+            <a:r>
+              <a:rPr kumimoji="1" lang="zh-CN" altLang="en-US" sz="1800" dirty="0" smtClean="0">
+                <a:latin typeface="+mj-ea"/>
+                <a:ea typeface="+mj-ea"/>
+                <a:cs typeface="Heiti SC Light"/>
+              </a:rPr>
+              <a:t>，</a:t>
+            </a:r>
+            <a:r>
+              <a:rPr kumimoji="1" lang="en-US" altLang="zh-CN" sz="1800" dirty="0" smtClean="0">
+                <a:latin typeface="+mj-ea"/>
+                <a:ea typeface="+mj-ea"/>
+                <a:cs typeface="Heiti SC Light"/>
+              </a:rPr>
+              <a:t>TRACE</a:t>
+            </a:r>
+          </a:p>
+          <a:p>
+            <a:pPr lvl="1">
+              <a:buFont typeface="Wingdings" charset="2"/>
+              <a:buChar char="Ø"/>
+            </a:pPr>
+            <a:endParaRPr kumimoji="1" lang="en-US" altLang="zh-CN" sz="1800" dirty="0">
+              <a:latin typeface="+mj-ea"/>
+              <a:ea typeface="+mj-ea"/>
+              <a:cs typeface="Heiti SC Light"/>
+            </a:endParaRPr>
+          </a:p>
+          <a:p>
+            <a:pPr>
+              <a:buFont typeface="Wingdings" charset="2"/>
+              <a:buChar char="Ø"/>
+            </a:pPr>
+            <a:r>
+              <a:rPr kumimoji="1" lang="zh-CN" altLang="en-US" sz="2000" dirty="0" smtClean="0">
+                <a:latin typeface="+mj-ea"/>
+                <a:ea typeface="+mj-ea"/>
+                <a:cs typeface="Heiti SC Light"/>
+              </a:rPr>
+              <a:t>通过查询参数</a:t>
+            </a:r>
+            <a:endParaRPr kumimoji="1" lang="en-US" altLang="zh-CN" sz="2000" dirty="0" smtClean="0">
+              <a:latin typeface="+mj-ea"/>
+              <a:ea typeface="+mj-ea"/>
+              <a:cs typeface="Heiti SC Light"/>
+            </a:endParaRPr>
+          </a:p>
+          <a:p>
+            <a:pPr lvl="1">
+              <a:buFont typeface="Wingdings" charset="2"/>
+              <a:buChar char="Ø"/>
+            </a:pPr>
+            <a:r>
+              <a:rPr kumimoji="1" lang="en-US" altLang="zh-CN" sz="1800" dirty="0">
+                <a:latin typeface="+mj-ea"/>
+                <a:ea typeface="+mj-ea"/>
+                <a:cs typeface="Heiti SC Light"/>
+              </a:rPr>
+              <a:t>@</a:t>
+            </a:r>
+            <a:r>
+              <a:rPr kumimoji="1" lang="en-US" altLang="zh-CN" sz="1800" dirty="0" err="1">
+                <a:latin typeface="+mj-ea"/>
+                <a:ea typeface="+mj-ea"/>
+                <a:cs typeface="Heiti SC Light"/>
+              </a:rPr>
+              <a:t>RequestMapping</a:t>
+            </a:r>
+            <a:r>
+              <a:rPr kumimoji="1" lang="en-US" altLang="zh-CN" sz="1800" dirty="0">
+                <a:latin typeface="+mj-ea"/>
+                <a:ea typeface="+mj-ea"/>
+                <a:cs typeface="Heiti SC Light"/>
+              </a:rPr>
+              <a:t>("path", method=</a:t>
+            </a:r>
+            <a:r>
+              <a:rPr kumimoji="1" lang="en-US" altLang="zh-CN" sz="1800" dirty="0" err="1">
+                <a:latin typeface="+mj-ea"/>
+                <a:ea typeface="+mj-ea"/>
+                <a:cs typeface="Heiti SC Light"/>
+              </a:rPr>
+              <a:t>RequestMethod.GET</a:t>
+            </a:r>
+            <a:r>
+              <a:rPr kumimoji="1" lang="en-US" altLang="zh-CN" sz="1800" dirty="0">
+                <a:latin typeface="+mj-ea"/>
+                <a:ea typeface="+mj-ea"/>
+                <a:cs typeface="Heiti SC Light"/>
+              </a:rPr>
+              <a:t>, </a:t>
+            </a:r>
+            <a:r>
+              <a:rPr kumimoji="1" lang="en-US" altLang="zh-CN" sz="1800" dirty="0" err="1">
+                <a:latin typeface="+mj-ea"/>
+                <a:ea typeface="+mj-ea"/>
+                <a:cs typeface="Heiti SC Light"/>
+              </a:rPr>
+              <a:t>params</a:t>
+            </a:r>
+            <a:r>
+              <a:rPr kumimoji="1" lang="en-US" altLang="zh-CN" sz="1800" dirty="0">
+                <a:latin typeface="+mj-ea"/>
+                <a:ea typeface="+mj-ea"/>
+                <a:cs typeface="Heiti SC Light"/>
+              </a:rPr>
+              <a:t>="foo"</a:t>
+            </a:r>
+            <a:r>
+              <a:rPr kumimoji="1" lang="en-US" altLang="zh-CN" sz="1800" dirty="0" smtClean="0">
+                <a:latin typeface="+mj-ea"/>
+                <a:ea typeface="+mj-ea"/>
+                <a:cs typeface="Heiti SC Light"/>
+              </a:rPr>
+              <a:t>)</a:t>
+            </a:r>
+          </a:p>
+          <a:p>
+            <a:pPr lvl="1">
+              <a:buFont typeface="Wingdings" charset="2"/>
+              <a:buChar char="Ø"/>
+            </a:pPr>
+            <a:r>
+              <a:rPr kumimoji="1" lang="zh-CN" altLang="en-US" sz="1800" dirty="0" smtClean="0">
+                <a:latin typeface="+mj-ea"/>
+                <a:ea typeface="+mj-ea"/>
+                <a:cs typeface="Heiti SC Light"/>
+              </a:rPr>
+              <a:t>也支持取反</a:t>
+            </a:r>
+            <a:r>
+              <a:rPr kumimoji="1" lang="en-US" altLang="zh-CN" sz="1800" dirty="0" smtClean="0">
+                <a:latin typeface="+mj-ea"/>
+                <a:ea typeface="+mj-ea"/>
+                <a:cs typeface="Heiti SC Light"/>
+              </a:rPr>
+              <a:t>:</a:t>
+            </a:r>
+            <a:r>
+              <a:rPr lang="pt-BR" altLang="zh-CN" sz="1800" dirty="0" err="1"/>
+              <a:t>params</a:t>
+            </a:r>
+            <a:r>
+              <a:rPr lang="pt-BR" altLang="zh-CN" sz="1800" dirty="0"/>
+              <a:t>={ "</a:t>
+            </a:r>
+            <a:r>
+              <a:rPr lang="pt-BR" altLang="zh-CN" sz="1800" dirty="0" err="1"/>
+              <a:t>foo</a:t>
+            </a:r>
+            <a:r>
+              <a:rPr lang="pt-BR" altLang="zh-CN" sz="1800" dirty="0"/>
+              <a:t>", "!bar" }</a:t>
+            </a:r>
+            <a:r>
+              <a:rPr lang="pt-BR" altLang="zh-CN" sz="1800" dirty="0" smtClean="0"/>
+              <a:t>)</a:t>
+            </a:r>
+          </a:p>
+          <a:p>
+            <a:pPr lvl="1">
+              <a:buFont typeface="Wingdings" charset="2"/>
+              <a:buChar char="Ø"/>
+            </a:pPr>
+            <a:endParaRPr lang="pt-BR" altLang="zh-CN" sz="1800" dirty="0" smtClean="0"/>
+          </a:p>
+          <a:p>
+            <a:pPr>
+              <a:buFont typeface="Wingdings" charset="2"/>
+              <a:buChar char="Ø"/>
+            </a:pPr>
+            <a:r>
+              <a:rPr kumimoji="1" lang="zh-CN" altLang="en-US" sz="2000" dirty="0" smtClean="0">
+                <a:latin typeface="+mj-ea"/>
+                <a:ea typeface="+mj-ea"/>
+                <a:cs typeface="Heiti SC Light"/>
+              </a:rPr>
+              <a:t>通过</a:t>
+            </a:r>
+            <a:r>
+              <a:rPr kumimoji="1" lang="en-US" altLang="zh-CN" sz="2000" dirty="0" smtClean="0">
+                <a:latin typeface="+mj-ea"/>
+                <a:ea typeface="+mj-ea"/>
+                <a:cs typeface="Heiti SC Light"/>
+              </a:rPr>
+              <a:t>Header</a:t>
+            </a:r>
+            <a:r>
+              <a:rPr kumimoji="1" lang="zh-CN" altLang="en-US" sz="2000" dirty="0" smtClean="0">
+                <a:latin typeface="+mj-ea"/>
+                <a:ea typeface="+mj-ea"/>
+                <a:cs typeface="Heiti SC Light"/>
+              </a:rPr>
+              <a:t>中的值</a:t>
+            </a:r>
+            <a:endParaRPr kumimoji="1" lang="en-US" altLang="zh-CN" sz="2000" dirty="0" smtClean="0">
+              <a:latin typeface="+mj-ea"/>
+              <a:ea typeface="+mj-ea"/>
+              <a:cs typeface="Heiti SC Light"/>
+            </a:endParaRPr>
+          </a:p>
+          <a:p>
+            <a:pPr lvl="1">
+              <a:buFont typeface="Wingdings" charset="2"/>
+              <a:buChar char="Ø"/>
+            </a:pPr>
+            <a:r>
+              <a:rPr kumimoji="1" lang="en-US" altLang="zh-CN" sz="1700" dirty="0" smtClean="0">
+                <a:latin typeface="+mj-ea"/>
+                <a:ea typeface="+mj-ea"/>
+                <a:cs typeface="Heiti SC Light"/>
+              </a:rPr>
+              <a:t>@</a:t>
+            </a:r>
+            <a:r>
+              <a:rPr kumimoji="1" lang="en-US" altLang="zh-CN" sz="1700" dirty="0" err="1">
+                <a:latin typeface="+mj-ea"/>
+                <a:ea typeface="+mj-ea"/>
+                <a:cs typeface="Heiti SC Light"/>
+              </a:rPr>
+              <a:t>RequestMapping</a:t>
+            </a:r>
+            <a:r>
+              <a:rPr kumimoji="1" lang="en-US" altLang="zh-CN" sz="1700" dirty="0">
+                <a:latin typeface="+mj-ea"/>
+                <a:ea typeface="+mj-ea"/>
+                <a:cs typeface="Heiti SC Light"/>
+              </a:rPr>
+              <a:t>("path", header="content-</a:t>
+            </a:r>
+            <a:r>
+              <a:rPr kumimoji="1" lang="en-US" altLang="zh-CN" sz="1700" dirty="0" smtClean="0">
+                <a:latin typeface="+mj-ea"/>
+                <a:ea typeface="+mj-ea"/>
+                <a:cs typeface="Heiti SC Light"/>
+              </a:rPr>
+              <a:t>type=</a:t>
+            </a:r>
+            <a:r>
+              <a:rPr kumimoji="1" lang="en-US" altLang="zh-CN" sz="1700" dirty="0">
+                <a:latin typeface="+mj-ea"/>
+                <a:ea typeface="+mj-ea"/>
+                <a:cs typeface="Heiti SC Light"/>
+              </a:rPr>
+              <a:t>text/*"</a:t>
+            </a:r>
+            <a:r>
+              <a:rPr kumimoji="1" lang="en-US" altLang="zh-CN" sz="1700" dirty="0" smtClean="0">
+                <a:latin typeface="+mj-ea"/>
+                <a:ea typeface="+mj-ea"/>
+                <a:cs typeface="Heiti SC Light"/>
+              </a:rPr>
+              <a:t>)</a:t>
+            </a:r>
+          </a:p>
+          <a:p>
+            <a:pPr lvl="1">
+              <a:buFont typeface="Wingdings" charset="2"/>
+              <a:buChar char="Ø"/>
+            </a:pPr>
+            <a:r>
+              <a:rPr kumimoji="1" lang="zh-CN" altLang="en-US" sz="1700" dirty="0">
+                <a:latin typeface="+mj-ea"/>
+                <a:ea typeface="+mj-ea"/>
+                <a:cs typeface="Heiti SC Light"/>
+              </a:rPr>
+              <a:t>也支持取</a:t>
+            </a:r>
+            <a:r>
+              <a:rPr kumimoji="1" lang="zh-CN" altLang="en-US" sz="1700" dirty="0" smtClean="0">
+                <a:latin typeface="+mj-ea"/>
+                <a:ea typeface="+mj-ea"/>
+                <a:cs typeface="Heiti SC Light"/>
+              </a:rPr>
+              <a:t>反</a:t>
+            </a:r>
+            <a:r>
+              <a:rPr kumimoji="1" lang="en-US" altLang="zh-CN" sz="1700" dirty="0" smtClean="0">
+                <a:latin typeface="+mj-ea"/>
+                <a:ea typeface="+mj-ea"/>
+                <a:cs typeface="Heiti SC Light"/>
+              </a:rPr>
+              <a:t>:</a:t>
+            </a:r>
+            <a:r>
+              <a:rPr kumimoji="1" lang="en-US" altLang="zh-CN" sz="1700" dirty="0">
+                <a:latin typeface="+mj-ea"/>
+                <a:ea typeface="+mj-ea"/>
+                <a:cs typeface="Heiti SC Light"/>
+              </a:rPr>
+              <a:t>header</a:t>
+            </a:r>
+            <a:r>
+              <a:rPr kumimoji="1" lang="en-US" altLang="zh-CN" sz="1700" dirty="0" smtClean="0">
+                <a:latin typeface="+mj-ea"/>
+                <a:ea typeface="+mj-ea"/>
+                <a:cs typeface="Heiti SC Light"/>
+              </a:rPr>
+              <a:t>="content</a:t>
+            </a:r>
+            <a:r>
+              <a:rPr kumimoji="1" lang="en-US" altLang="zh-CN" sz="1700" dirty="0">
+                <a:latin typeface="+mj-ea"/>
+                <a:ea typeface="+mj-ea"/>
+                <a:cs typeface="Heiti SC Light"/>
+              </a:rPr>
+              <a:t>-</a:t>
+            </a:r>
+            <a:r>
+              <a:rPr kumimoji="1" lang="en-US" altLang="zh-CN" sz="1700" dirty="0" smtClean="0">
+                <a:latin typeface="+mj-ea"/>
+                <a:ea typeface="+mj-ea"/>
+                <a:cs typeface="Heiti SC Light"/>
+              </a:rPr>
+              <a:t>type!=</a:t>
+            </a:r>
+            <a:r>
+              <a:rPr kumimoji="1" lang="en-US" altLang="zh-CN" sz="1700" dirty="0">
+                <a:latin typeface="+mj-ea"/>
+                <a:ea typeface="+mj-ea"/>
+                <a:cs typeface="Heiti SC Light"/>
+              </a:rPr>
+              <a:t>text/*"</a:t>
+            </a:r>
+            <a:endParaRPr kumimoji="1" lang="en-US" altLang="zh-CN" sz="1600" dirty="0">
+              <a:latin typeface="+mj-ea"/>
+              <a:ea typeface="+mj-ea"/>
+              <a:cs typeface="Heiti SC Light"/>
+            </a:endParaRPr>
+          </a:p>
+        </p:txBody>
+      </p:sp>
+      <p:sp>
+        <p:nvSpPr>
+          <p:cNvPr id="2" name="标题 1"/>
+          <p:cNvSpPr>
+            <a:spLocks noGrp="1"/>
+          </p:cNvSpPr>
+          <p:nvPr>
+            <p:ph type="title"/>
+          </p:nvPr>
+        </p:nvSpPr>
+        <p:spPr/>
+        <p:txBody>
+          <a:bodyPr/>
+          <a:lstStyle/>
+          <a:p>
+            <a:r>
+              <a:rPr kumimoji="1" lang="en-US" altLang="zh-CN" dirty="0" err="1" smtClean="0">
+                <a:latin typeface="+mj-ea"/>
+                <a:cs typeface="Heiti SC Light"/>
+              </a:rPr>
+              <a:t>Request</a:t>
+            </a:r>
+            <a:r>
+              <a:rPr kumimoji="1" lang="en-US" altLang="en-US" dirty="0" err="1" smtClean="0">
+                <a:latin typeface="+mj-ea"/>
+                <a:cs typeface="Heiti SC Light"/>
+              </a:rPr>
+              <a:t>映射</a:t>
+            </a:r>
+            <a:endParaRPr kumimoji="1" lang="zh-CN" altLang="en-US" dirty="0">
+              <a:latin typeface="+mj-ea"/>
+              <a:cs typeface="Heiti SC Light"/>
+            </a:endParaRPr>
+          </a:p>
+        </p:txBody>
+      </p:sp>
+    </p:spTree>
+    <p:extLst>
+      <p:ext uri="{BB962C8B-B14F-4D97-AF65-F5344CB8AC3E}">
+        <p14:creationId xmlns:p14="http://schemas.microsoft.com/office/powerpoint/2010/main" val="2563776707"/>
+      </p:ext>
+    </p:extLst>
+  </p:cSld>
+  <p:clrMapOvr>
+    <a:masterClrMapping/>
+  </p:clrMapOvr>
+  <p:timing>
+    <p:tnLst>
+      <p:par>
+        <p:cTn xmlns:p14="http://schemas.microsoft.com/office/powerpoint/2010/main" id="1" dur="indefinite" restart="never" nodeType="tmRoot"/>
       </p:par>
     </p:tnLst>
   </p:timing>

</xml_diff>